<commit_message>
Minor changes 2022-10-12 (week 2)
</commit_message>
<xml_diff>
--- a/Basic_python/4 Strings.pptx
+++ b/Basic_python/4 Strings.pptx
@@ -144,6 +144,54 @@
 
 <file path=ppt/changesInfos/changesInfo1.xml><?xml version="1.0" encoding="utf-8"?>
 <pc:chgInfo xmlns:a="http://schemas.openxmlformats.org/drawingml/2006/main" xmlns:r="http://schemas.openxmlformats.org/officeDocument/2006/relationships" xmlns:ac="http://schemas.microsoft.com/office/drawing/2013/main/command" xmlns:pc="http://schemas.microsoft.com/office/powerpoint/2013/main/command">
+  <pc:docChgLst>
+    <pc:chgData name="Brent Pulmans" userId="8ae858ac-1a5b-43d2-9c3f-1bf2d06d427e" providerId="ADAL" clId="{51FE991B-37FB-4448-9734-5365B5307753}"/>
+    <pc:docChg chg="modSld">
+      <pc:chgData name="Brent Pulmans" userId="8ae858ac-1a5b-43d2-9c3f-1bf2d06d427e" providerId="ADAL" clId="{51FE991B-37FB-4448-9734-5365B5307753}" dt="2022-10-03T19:06:34.778" v="1" actId="20577"/>
+      <pc:docMkLst>
+        <pc:docMk/>
+      </pc:docMkLst>
+      <pc:sldChg chg="modSp mod">
+        <pc:chgData name="Brent Pulmans" userId="8ae858ac-1a5b-43d2-9c3f-1bf2d06d427e" providerId="ADAL" clId="{51FE991B-37FB-4448-9734-5365B5307753}" dt="2022-10-03T19:06:34.778" v="1" actId="20577"/>
+        <pc:sldMkLst>
+          <pc:docMk/>
+          <pc:sldMk cId="3039303716" sldId="260"/>
+        </pc:sldMkLst>
+        <pc:graphicFrameChg chg="modGraphic">
+          <ac:chgData name="Brent Pulmans" userId="8ae858ac-1a5b-43d2-9c3f-1bf2d06d427e" providerId="ADAL" clId="{51FE991B-37FB-4448-9734-5365B5307753}" dt="2022-10-03T19:06:34.778" v="1" actId="20577"/>
+          <ac:graphicFrameMkLst>
+            <pc:docMk/>
+            <pc:sldMk cId="3039303716" sldId="260"/>
+            <ac:graphicFrameMk id="6" creationId="{00000000-0000-0000-0000-000000000000}"/>
+          </ac:graphicFrameMkLst>
+        </pc:graphicFrameChg>
+      </pc:sldChg>
+    </pc:docChg>
+  </pc:docChgLst>
+  <pc:docChgLst>
+    <pc:chgData name="Ellen Torfs" userId="c6aa1e10-4a12-4511-8c7c-135720d4f277" providerId="ADAL" clId="{900C8C31-5602-4C23-B0E7-793A1E49C225}"/>
+    <pc:docChg chg="custSel modSld replTag delTag">
+      <pc:chgData name="Ellen Torfs" userId="c6aa1e10-4a12-4511-8c7c-135720d4f277" providerId="ADAL" clId="{900C8C31-5602-4C23-B0E7-793A1E49C225}" dt="2021-09-29T12:02:24.413" v="8"/>
+      <pc:docMkLst>
+        <pc:docMk/>
+      </pc:docMkLst>
+      <pc:sldChg chg="modSp mod">
+        <pc:chgData name="Ellen Torfs" userId="c6aa1e10-4a12-4511-8c7c-135720d4f277" providerId="ADAL" clId="{900C8C31-5602-4C23-B0E7-793A1E49C225}" dt="2021-09-29T12:02:11.680" v="5" actId="6549"/>
+        <pc:sldMkLst>
+          <pc:docMk/>
+          <pc:sldMk cId="276242539" sldId="283"/>
+        </pc:sldMkLst>
+        <pc:spChg chg="mod">
+          <ac:chgData name="Ellen Torfs" userId="c6aa1e10-4a12-4511-8c7c-135720d4f277" providerId="ADAL" clId="{900C8C31-5602-4C23-B0E7-793A1E49C225}" dt="2021-09-29T12:02:11.680" v="5" actId="6549"/>
+          <ac:spMkLst>
+            <pc:docMk/>
+            <pc:sldMk cId="276242539" sldId="283"/>
+            <ac:spMk id="9" creationId="{02B9FABA-431E-4D91-9C4A-22F20431C133}"/>
+          </ac:spMkLst>
+        </pc:spChg>
+      </pc:sldChg>
+    </pc:docChg>
+  </pc:docChgLst>
   <pc:docChgLst>
     <pc:chgData name="Eric Pauwels" userId="3a80159d-93b9-43cb-8c4f-9fabd2a5db77" providerId="ADAL" clId="{939ED9FE-3108-422A-B346-73B2C8A65918}"/>
     <pc:docChg chg="modSld">
@@ -529,6 +577,45 @@
     </pc:docChg>
   </pc:docChgLst>
   <pc:docChgLst>
+    <pc:chgData name="Jochen Mariën" userId="a4f8d9ed-3895-4365-b2d5-9432cb8a20d4" providerId="ADAL" clId="{6BFAC027-916E-43FA-B02A-94F470E01A10}"/>
+    <pc:docChg chg="modSld">
+      <pc:chgData name="Jochen Mariën" userId="a4f8d9ed-3895-4365-b2d5-9432cb8a20d4" providerId="ADAL" clId="{6BFAC027-916E-43FA-B02A-94F470E01A10}" dt="2022-06-08T07:43:37.568" v="5"/>
+      <pc:docMkLst>
+        <pc:docMk/>
+      </pc:docMkLst>
+      <pc:sldChg chg="addSp modSp">
+        <pc:chgData name="Jochen Mariën" userId="a4f8d9ed-3895-4365-b2d5-9432cb8a20d4" providerId="ADAL" clId="{6BFAC027-916E-43FA-B02A-94F470E01A10}" dt="2022-05-25T13:25:52.866" v="0"/>
+        <pc:sldMkLst>
+          <pc:docMk/>
+          <pc:sldMk cId="54334544" sldId="256"/>
+        </pc:sldMkLst>
+        <pc:picChg chg="add mod">
+          <ac:chgData name="Jochen Mariën" userId="a4f8d9ed-3895-4365-b2d5-9432cb8a20d4" providerId="ADAL" clId="{6BFAC027-916E-43FA-B02A-94F470E01A10}" dt="2022-05-25T13:25:52.866" v="0"/>
+          <ac:picMkLst>
+            <pc:docMk/>
+            <pc:sldMk cId="54334544" sldId="256"/>
+            <ac:picMk id="4" creationId="{7F1092F6-E73A-4C9C-2429-32B01F3B08E9}"/>
+          </ac:picMkLst>
+        </pc:picChg>
+      </pc:sldChg>
+      <pc:sldChg chg="modSp mod">
+        <pc:chgData name="Jochen Mariën" userId="a4f8d9ed-3895-4365-b2d5-9432cb8a20d4" providerId="ADAL" clId="{6BFAC027-916E-43FA-B02A-94F470E01A10}" dt="2022-06-08T07:43:37.568" v="5"/>
+        <pc:sldMkLst>
+          <pc:docMk/>
+          <pc:sldMk cId="4220595097" sldId="276"/>
+        </pc:sldMkLst>
+        <pc:spChg chg="mod">
+          <ac:chgData name="Jochen Mariën" userId="a4f8d9ed-3895-4365-b2d5-9432cb8a20d4" providerId="ADAL" clId="{6BFAC027-916E-43FA-B02A-94F470E01A10}" dt="2022-06-08T07:43:37.568" v="5"/>
+          <ac:spMkLst>
+            <pc:docMk/>
+            <pc:sldMk cId="4220595097" sldId="276"/>
+            <ac:spMk id="8" creationId="{419FEFE8-63CE-4DCA-ADA5-180395731EC2}"/>
+          </ac:spMkLst>
+        </pc:spChg>
+      </pc:sldChg>
+    </pc:docChg>
+  </pc:docChgLst>
+  <pc:docChgLst>
     <pc:chgData name="Ellen Torfs" userId="c6aa1e10-4a12-4511-8c7c-135720d4f277" providerId="ADAL" clId="{8469C342-E05A-4630-A94A-C33770F42513}"/>
     <pc:docChg chg="custSel modSld replTag delTag">
       <pc:chgData name="Ellen Torfs" userId="c6aa1e10-4a12-4511-8c7c-135720d4f277" providerId="ADAL" clId="{8469C342-E05A-4630-A94A-C33770F42513}" dt="2021-09-29T11:01:09.447" v="58"/>
@@ -605,93 +692,6 @@
       </pc:sldChg>
     </pc:docChg>
   </pc:docChgLst>
-  <pc:docChgLst>
-    <pc:chgData name="Jochen Mariën" userId="a4f8d9ed-3895-4365-b2d5-9432cb8a20d4" providerId="ADAL" clId="{6BFAC027-916E-43FA-B02A-94F470E01A10}"/>
-    <pc:docChg chg="modSld">
-      <pc:chgData name="Jochen Mariën" userId="a4f8d9ed-3895-4365-b2d5-9432cb8a20d4" providerId="ADAL" clId="{6BFAC027-916E-43FA-B02A-94F470E01A10}" dt="2022-06-08T07:43:37.568" v="5"/>
-      <pc:docMkLst>
-        <pc:docMk/>
-      </pc:docMkLst>
-      <pc:sldChg chg="addSp modSp">
-        <pc:chgData name="Jochen Mariën" userId="a4f8d9ed-3895-4365-b2d5-9432cb8a20d4" providerId="ADAL" clId="{6BFAC027-916E-43FA-B02A-94F470E01A10}" dt="2022-05-25T13:25:52.866" v="0"/>
-        <pc:sldMkLst>
-          <pc:docMk/>
-          <pc:sldMk cId="54334544" sldId="256"/>
-        </pc:sldMkLst>
-        <pc:picChg chg="add mod">
-          <ac:chgData name="Jochen Mariën" userId="a4f8d9ed-3895-4365-b2d5-9432cb8a20d4" providerId="ADAL" clId="{6BFAC027-916E-43FA-B02A-94F470E01A10}" dt="2022-05-25T13:25:52.866" v="0"/>
-          <ac:picMkLst>
-            <pc:docMk/>
-            <pc:sldMk cId="54334544" sldId="256"/>
-            <ac:picMk id="4" creationId="{7F1092F6-E73A-4C9C-2429-32B01F3B08E9}"/>
-          </ac:picMkLst>
-        </pc:picChg>
-      </pc:sldChg>
-      <pc:sldChg chg="modSp mod">
-        <pc:chgData name="Jochen Mariën" userId="a4f8d9ed-3895-4365-b2d5-9432cb8a20d4" providerId="ADAL" clId="{6BFAC027-916E-43FA-B02A-94F470E01A10}" dt="2022-06-08T07:43:37.568" v="5"/>
-        <pc:sldMkLst>
-          <pc:docMk/>
-          <pc:sldMk cId="4220595097" sldId="276"/>
-        </pc:sldMkLst>
-        <pc:spChg chg="mod">
-          <ac:chgData name="Jochen Mariën" userId="a4f8d9ed-3895-4365-b2d5-9432cb8a20d4" providerId="ADAL" clId="{6BFAC027-916E-43FA-B02A-94F470E01A10}" dt="2022-06-08T07:43:37.568" v="5"/>
-          <ac:spMkLst>
-            <pc:docMk/>
-            <pc:sldMk cId="4220595097" sldId="276"/>
-            <ac:spMk id="8" creationId="{419FEFE8-63CE-4DCA-ADA5-180395731EC2}"/>
-          </ac:spMkLst>
-        </pc:spChg>
-      </pc:sldChg>
-    </pc:docChg>
-  </pc:docChgLst>
-  <pc:docChgLst>
-    <pc:chgData name="Brent Pulmans" userId="8ae858ac-1a5b-43d2-9c3f-1bf2d06d427e" providerId="ADAL" clId="{51FE991B-37FB-4448-9734-5365B5307753}"/>
-    <pc:docChg chg="modSld">
-      <pc:chgData name="Brent Pulmans" userId="8ae858ac-1a5b-43d2-9c3f-1bf2d06d427e" providerId="ADAL" clId="{51FE991B-37FB-4448-9734-5365B5307753}" dt="2022-10-03T19:06:34.778" v="1" actId="20577"/>
-      <pc:docMkLst>
-        <pc:docMk/>
-      </pc:docMkLst>
-      <pc:sldChg chg="modSp mod">
-        <pc:chgData name="Brent Pulmans" userId="8ae858ac-1a5b-43d2-9c3f-1bf2d06d427e" providerId="ADAL" clId="{51FE991B-37FB-4448-9734-5365B5307753}" dt="2022-10-03T19:06:34.778" v="1" actId="20577"/>
-        <pc:sldMkLst>
-          <pc:docMk/>
-          <pc:sldMk cId="3039303716" sldId="260"/>
-        </pc:sldMkLst>
-        <pc:graphicFrameChg chg="modGraphic">
-          <ac:chgData name="Brent Pulmans" userId="8ae858ac-1a5b-43d2-9c3f-1bf2d06d427e" providerId="ADAL" clId="{51FE991B-37FB-4448-9734-5365B5307753}" dt="2022-10-03T19:06:34.778" v="1" actId="20577"/>
-          <ac:graphicFrameMkLst>
-            <pc:docMk/>
-            <pc:sldMk cId="3039303716" sldId="260"/>
-            <ac:graphicFrameMk id="6" creationId="{00000000-0000-0000-0000-000000000000}"/>
-          </ac:graphicFrameMkLst>
-        </pc:graphicFrameChg>
-      </pc:sldChg>
-    </pc:docChg>
-  </pc:docChgLst>
-  <pc:docChgLst>
-    <pc:chgData name="Ellen Torfs" userId="c6aa1e10-4a12-4511-8c7c-135720d4f277" providerId="ADAL" clId="{900C8C31-5602-4C23-B0E7-793A1E49C225}"/>
-    <pc:docChg chg="custSel modSld replTag delTag">
-      <pc:chgData name="Ellen Torfs" userId="c6aa1e10-4a12-4511-8c7c-135720d4f277" providerId="ADAL" clId="{900C8C31-5602-4C23-B0E7-793A1E49C225}" dt="2021-09-29T12:02:24.413" v="8"/>
-      <pc:docMkLst>
-        <pc:docMk/>
-      </pc:docMkLst>
-      <pc:sldChg chg="modSp mod">
-        <pc:chgData name="Ellen Torfs" userId="c6aa1e10-4a12-4511-8c7c-135720d4f277" providerId="ADAL" clId="{900C8C31-5602-4C23-B0E7-793A1E49C225}" dt="2021-09-29T12:02:11.680" v="5" actId="6549"/>
-        <pc:sldMkLst>
-          <pc:docMk/>
-          <pc:sldMk cId="276242539" sldId="283"/>
-        </pc:sldMkLst>
-        <pc:spChg chg="mod">
-          <ac:chgData name="Ellen Torfs" userId="c6aa1e10-4a12-4511-8c7c-135720d4f277" providerId="ADAL" clId="{900C8C31-5602-4C23-B0E7-793A1E49C225}" dt="2021-09-29T12:02:11.680" v="5" actId="6549"/>
-          <ac:spMkLst>
-            <pc:docMk/>
-            <pc:sldMk cId="276242539" sldId="283"/>
-            <ac:spMk id="9" creationId="{02B9FABA-431E-4D91-9C4A-22F20431C133}"/>
-          </ac:spMkLst>
-        </pc:spChg>
-      </pc:sldChg>
-    </pc:docChg>
-  </pc:docChgLst>
 </pc:chgInfo>
 </file>
 
@@ -777,7 +777,7 @@
           <a:p>
             <a:fld id="{4D53584B-980D-4F7D-BA36-682FCDF648BB}" type="datetimeFigureOut">
               <a:rPr lang="nl-BE" smtClean="0"/>
-              <a:t>3/10/2022</a:t>
+              <a:t>12/10/2022</a:t>
             </a:fld>
             <a:endParaRPr lang="nl-BE"/>
           </a:p>
@@ -1709,7 +1709,7 @@
           <a:p>
             <a:fld id="{9DBA54DB-1B16-4AD1-A9F9-560BFE3100B9}" type="datetime1">
               <a:rPr lang="nl-BE" smtClean="0"/>
-              <a:t>3/10/2022</a:t>
+              <a:t>12/10/2022</a:t>
             </a:fld>
             <a:endParaRPr lang="nl-BE"/>
           </a:p>
@@ -1961,7 +1961,7 @@
           <a:p>
             <a:fld id="{7BE4DD14-A5A2-4EBE-8108-B4151B97AFA3}" type="datetime1">
               <a:rPr lang="nl-BE" smtClean="0"/>
-              <a:t>3/10/2022</a:t>
+              <a:t>12/10/2022</a:t>
             </a:fld>
             <a:endParaRPr lang="nl-BE"/>
           </a:p>
@@ -2141,7 +2141,7 @@
           <a:p>
             <a:fld id="{3FD6D2C0-23FD-48D4-8694-5C8CCB26DE5B}" type="datetime1">
               <a:rPr lang="nl-BE" smtClean="0"/>
-              <a:t>3/10/2022</a:t>
+              <a:t>12/10/2022</a:t>
             </a:fld>
             <a:endParaRPr lang="nl-BE"/>
           </a:p>
@@ -2340,7 +2340,7 @@
           <a:p>
             <a:fld id="{7F502A1D-A910-4100-B61A-B3604D95ED9D}" type="datetime1">
               <a:rPr lang="nl-BE" smtClean="0"/>
-              <a:t>3/10/2022</a:t>
+              <a:t>12/10/2022</a:t>
             </a:fld>
             <a:endParaRPr lang="nl-BE"/>
           </a:p>
@@ -2591,7 +2591,7 @@
           <a:p>
             <a:fld id="{FC274EC3-A4C1-4AD9-8B7B-E6619E9154A0}" type="datetime1">
               <a:rPr lang="nl-BE" smtClean="0"/>
-              <a:t>3/10/2022</a:t>
+              <a:t>12/10/2022</a:t>
             </a:fld>
             <a:endParaRPr lang="nl-BE"/>
           </a:p>
@@ -2823,7 +2823,7 @@
           <a:p>
             <a:fld id="{19D8E8DE-ADBC-4B34-812D-AE94AC273780}" type="datetime1">
               <a:rPr lang="nl-BE" smtClean="0"/>
-              <a:t>3/10/2022</a:t>
+              <a:t>12/10/2022</a:t>
             </a:fld>
             <a:endParaRPr lang="nl-BE"/>
           </a:p>
@@ -3190,7 +3190,7 @@
           <a:p>
             <a:fld id="{31505BAB-8768-4F28-94D4-0FB2B7E5CAF3}" type="datetime1">
               <a:rPr lang="nl-BE" smtClean="0"/>
-              <a:t>3/10/2022</a:t>
+              <a:t>12/10/2022</a:t>
             </a:fld>
             <a:endParaRPr lang="nl-BE"/>
           </a:p>
@@ -3308,7 +3308,7 @@
           <a:p>
             <a:fld id="{0E166F45-FB20-41E3-B1E4-21B171F68161}" type="datetime1">
               <a:rPr lang="nl-BE" smtClean="0"/>
-              <a:t>3/10/2022</a:t>
+              <a:t>12/10/2022</a:t>
             </a:fld>
             <a:endParaRPr lang="nl-BE"/>
           </a:p>
@@ -3403,7 +3403,7 @@
           <a:p>
             <a:fld id="{0FF58E41-313F-407F-8EC3-61136F94D127}" type="datetime1">
               <a:rPr lang="nl-BE" smtClean="0"/>
-              <a:t>3/10/2022</a:t>
+              <a:t>12/10/2022</a:t>
             </a:fld>
             <a:endParaRPr lang="nl-BE"/>
           </a:p>
@@ -3680,7 +3680,7 @@
           <a:p>
             <a:fld id="{B85B5F37-38DA-4EAB-81BB-622D74C0BD14}" type="datetime1">
               <a:rPr lang="nl-BE" smtClean="0"/>
-              <a:t>3/10/2022</a:t>
+              <a:t>12/10/2022</a:t>
             </a:fld>
             <a:endParaRPr lang="nl-BE"/>
           </a:p>
@@ -3933,7 +3933,7 @@
           <a:p>
             <a:fld id="{AD728687-702D-4DA9-A09E-7D549958D675}" type="datetime1">
               <a:rPr lang="nl-BE" smtClean="0"/>
-              <a:t>3/10/2022</a:t>
+              <a:t>12/10/2022</a:t>
             </a:fld>
             <a:endParaRPr lang="nl-BE"/>
           </a:p>
@@ -4146,7 +4146,7 @@
           <a:p>
             <a:fld id="{99CD3CD4-31DA-4C13-BE74-A8E9DA10F56B}" type="datetime1">
               <a:rPr lang="nl-BE" smtClean="0"/>
-              <a:t>3/10/2022</a:t>
+              <a:t>12/10/2022</a:t>
             </a:fld>
             <a:endParaRPr lang="nl-BE"/>
           </a:p>
@@ -19288,17 +19288,17 @@
               <a:t>(</a:t>
             </a:r>
             <a:r>
-              <a:rPr kumimoji="0" lang="nl-BE" altLang="nl-BE" sz="2000" b="0" i="0" u="none" strike="noStrike" cap="none" normalizeH="0" baseline="0" dirty="0" err="1">
+              <a:rPr kumimoji="0" lang="nl-BE" altLang="nl-BE" sz="2000" b="1" i="0" u="none" strike="noStrike" cap="none" normalizeH="0" baseline="0" dirty="0">
                 <a:ln>
                   <a:noFill/>
                 </a:ln>
                 <a:solidFill>
-                  <a:srgbClr val="080808"/>
-                </a:solidFill>
-                <a:effectLst/>
-                <a:latin typeface="Consolas" panose="020B0609020204030204" pitchFamily="49" charset="0"/>
-              </a:rPr>
-              <a:t>f</a:t>
+                  <a:srgbClr val="008080"/>
+                </a:solidFill>
+                <a:effectLst/>
+                <a:latin typeface="Consolas" panose="020B0609020204030204" pitchFamily="49" charset="0"/>
+              </a:rPr>
+              <a:t>'</a:t>
             </a:r>
             <a:r>
               <a:rPr kumimoji="0" lang="nl-BE" altLang="nl-BE" sz="2000" b="1" i="0" u="none" strike="noStrike" cap="none" normalizeH="0" baseline="0" dirty="0" err="1">
@@ -19311,7 +19311,7 @@
                 <a:effectLst/>
                 <a:latin typeface="Consolas" panose="020B0609020204030204" pitchFamily="49" charset="0"/>
               </a:rPr>
-              <a:t>'Your</a:t>
+              <a:t>Your</a:t>
             </a:r>
             <a:r>
               <a:rPr kumimoji="0" lang="nl-BE" altLang="nl-BE" sz="2000" b="1" i="0" u="none" strike="noStrike" cap="none" normalizeH="0" baseline="0" dirty="0">
@@ -19324,59 +19324,20 @@
                 <a:effectLst/>
                 <a:latin typeface="Consolas" panose="020B0609020204030204" pitchFamily="49" charset="0"/>
               </a:rPr>
-              <a:t> percentage</a:t>
-            </a:r>
-            <a:r>
-              <a:rPr kumimoji="0" lang="nl-BE" altLang="nl-BE" sz="2000" b="1" i="0" u="none" strike="noStrike" cap="none" normalizeH="0" baseline="0">
+              <a:t> percentage: {:.2%}'</a:t>
+            </a:r>
+            <a:r>
+              <a:rPr kumimoji="0" lang="nl-BE" altLang="nl-BE" sz="2000" b="0" i="0" u="none" strike="noStrike" cap="none" normalizeH="0" baseline="0" dirty="0">
                 <a:ln>
                   <a:noFill/>
                 </a:ln>
                 <a:solidFill>
-                  <a:srgbClr val="008080"/>
-                </a:solidFill>
-                <a:effectLst/>
-                <a:latin typeface="Consolas" panose="020B0609020204030204" pitchFamily="49" charset="0"/>
-              </a:rPr>
-              <a:t>: {</a:t>
-            </a:r>
-            <a:r>
-              <a:rPr kumimoji="0" lang="nl-BE" altLang="nl-BE" sz="2000" b="0" i="0" u="none" strike="noStrike" cap="none" normalizeH="0" baseline="0">
-                <a:ln>
-                  <a:noFill/>
-                </a:ln>
-                <a:solidFill>
                   <a:srgbClr val="080808"/>
                 </a:solidFill>
                 <a:effectLst/>
                 <a:latin typeface="Consolas" panose="020B0609020204030204" pitchFamily="49" charset="0"/>
               </a:rPr>
-              <a:t>score</a:t>
-            </a:r>
-            <a:r>
-              <a:rPr kumimoji="0" lang="nl-BE" altLang="nl-BE" sz="2000" b="1" i="0" u="none" strike="noStrike" cap="none" normalizeH="0" baseline="0">
-                <a:ln>
-                  <a:noFill/>
-                </a:ln>
-                <a:solidFill>
-                  <a:srgbClr val="008080"/>
-                </a:solidFill>
-                <a:effectLst/>
-                <a:latin typeface="Consolas" panose="020B0609020204030204" pitchFamily="49" charset="0"/>
-              </a:rPr>
-              <a:t>:.2%}'</a:t>
-            </a:r>
-            <a:r>
-              <a:rPr kumimoji="0" lang="nl-BE" altLang="nl-BE" sz="2000" b="0" i="0" u="none" strike="noStrike" cap="none" normalizeH="0" baseline="0">
-                <a:ln>
-                  <a:noFill/>
-                </a:ln>
-                <a:solidFill>
-                  <a:srgbClr val="080808"/>
-                </a:solidFill>
-                <a:effectLst/>
-                <a:latin typeface="Consolas" panose="020B0609020204030204" pitchFamily="49" charset="0"/>
-              </a:rPr>
-              <a:t>)</a:t>
+              <a:t>.format(score))</a:t>
             </a:r>
             <a:endParaRPr kumimoji="0" lang="nl-BE" altLang="nl-BE" sz="4400" b="0" i="0" u="none" strike="noStrike" cap="none" normalizeH="0" baseline="0" dirty="0">
               <a:ln>

</xml_diff>